<commit_message>
Add Updated Capstone Code and Presentations
</commit_message>
<xml_diff>
--- a/Miscellaneous/Springboard_Capstone.pptx
+++ b/Miscellaneous/Springboard_Capstone.pptx
@@ -845,7 +845,7 @@
           <a:p>
             <a:fld id="{4AAD347D-5ACD-4C99-B74B-A9C85AD731AF}" type="datetimeFigureOut">
               <a:rPr lang="en-US" smtClean="0"/>
-              <a:t>7/10/2018</a:t>
+              <a:t>7/29/2018</a:t>
             </a:fld>
             <a:endParaRPr lang="en-US" dirty="0"/>
           </a:p>
@@ -1096,7 +1096,7 @@
           <a:p>
             <a:fld id="{4AAD347D-5ACD-4C99-B74B-A9C85AD731AF}" type="datetimeFigureOut">
               <a:rPr lang="en-US" smtClean="0"/>
-              <a:t>7/10/2018</a:t>
+              <a:t>7/29/2018</a:t>
             </a:fld>
             <a:endParaRPr lang="en-US" dirty="0"/>
           </a:p>
@@ -1411,7 +1411,7 @@
           <a:p>
             <a:fld id="{4AAD347D-5ACD-4C99-B74B-A9C85AD731AF}" type="datetimeFigureOut">
               <a:rPr lang="en-US" smtClean="0"/>
-              <a:t>7/10/2018</a:t>
+              <a:t>7/29/2018</a:t>
             </a:fld>
             <a:endParaRPr lang="en-US" dirty="0"/>
           </a:p>
@@ -1753,7 +1753,7 @@
           <a:p>
             <a:fld id="{4509A250-FF31-4206-8172-F9D3106AACB1}" type="datetimeFigureOut">
               <a:rPr lang="en-US" smtClean="0"/>
-              <a:t>7/10/2018</a:t>
+              <a:t>7/29/2018</a:t>
             </a:fld>
             <a:endParaRPr lang="en-US" dirty="0"/>
           </a:p>
@@ -2067,7 +2067,7 @@
           <a:p>
             <a:fld id="{4AAD347D-5ACD-4C99-B74B-A9C85AD731AF}" type="datetimeFigureOut">
               <a:rPr lang="en-US" smtClean="0"/>
-              <a:t>7/10/2018</a:t>
+              <a:t>7/29/2018</a:t>
             </a:fld>
             <a:endParaRPr lang="en-US" dirty="0"/>
           </a:p>
@@ -2461,7 +2461,7 @@
           <a:p>
             <a:fld id="{4AAD347D-5ACD-4C99-B74B-A9C85AD731AF}" type="datetimeFigureOut">
               <a:rPr lang="en-US" smtClean="0"/>
-              <a:t>7/10/2018</a:t>
+              <a:t>7/29/2018</a:t>
             </a:fld>
             <a:endParaRPr lang="en-US" dirty="0"/>
           </a:p>
@@ -2632,7 +2632,7 @@
           <a:p>
             <a:fld id="{4509A250-FF31-4206-8172-F9D3106AACB1}" type="datetimeFigureOut">
               <a:rPr lang="en-US" smtClean="0"/>
-              <a:t>7/10/2018</a:t>
+              <a:t>7/29/2018</a:t>
             </a:fld>
             <a:endParaRPr lang="en-US" dirty="0"/>
           </a:p>
@@ -2812,7 +2812,7 @@
           <a:p>
             <a:fld id="{4509A250-FF31-4206-8172-F9D3106AACB1}" type="datetimeFigureOut">
               <a:rPr lang="en-US" smtClean="0"/>
-              <a:t>7/10/2018</a:t>
+              <a:t>7/29/2018</a:t>
             </a:fld>
             <a:endParaRPr lang="en-US" dirty="0"/>
           </a:p>
@@ -2988,7 +2988,7 @@
           <a:p>
             <a:fld id="{4509A250-FF31-4206-8172-F9D3106AACB1}" type="datetimeFigureOut">
               <a:rPr lang="en-US" smtClean="0"/>
-              <a:t>7/10/2018</a:t>
+              <a:t>7/29/2018</a:t>
             </a:fld>
             <a:endParaRPr lang="en-US" dirty="0"/>
           </a:p>
@@ -3235,7 +3235,7 @@
           <a:p>
             <a:fld id="{9796027F-7875-4030-9381-8BD8C4F21935}" type="datetimeFigureOut">
               <a:rPr lang="en-US" smtClean="0"/>
-              <a:t>7/10/2018</a:t>
+              <a:t>7/29/2018</a:t>
             </a:fld>
             <a:endParaRPr lang="en-US" dirty="0"/>
           </a:p>
@@ -3467,7 +3467,7 @@
           <a:p>
             <a:fld id="{9796027F-7875-4030-9381-8BD8C4F21935}" type="datetimeFigureOut">
               <a:rPr lang="en-US" smtClean="0"/>
-              <a:t>7/10/2018</a:t>
+              <a:t>7/29/2018</a:t>
             </a:fld>
             <a:endParaRPr lang="en-US" dirty="0"/>
           </a:p>
@@ -3841,7 +3841,7 @@
           <a:p>
             <a:fld id="{9796027F-7875-4030-9381-8BD8C4F21935}" type="datetimeFigureOut">
               <a:rPr lang="en-US" smtClean="0"/>
-              <a:t>7/10/2018</a:t>
+              <a:t>7/29/2018</a:t>
             </a:fld>
             <a:endParaRPr lang="en-US" dirty="0"/>
           </a:p>
@@ -3964,7 +3964,7 @@
           <a:p>
             <a:fld id="{4509A250-FF31-4206-8172-F9D3106AACB1}" type="datetimeFigureOut">
               <a:rPr lang="en-US" smtClean="0"/>
-              <a:t>7/10/2018</a:t>
+              <a:t>7/29/2018</a:t>
             </a:fld>
             <a:endParaRPr lang="en-US" dirty="0"/>
           </a:p>
@@ -4059,7 +4059,7 @@
           <a:p>
             <a:fld id="{4509A250-FF31-4206-8172-F9D3106AACB1}" type="datetimeFigureOut">
               <a:rPr lang="en-US" smtClean="0"/>
-              <a:t>7/10/2018</a:t>
+              <a:t>7/29/2018</a:t>
             </a:fld>
             <a:endParaRPr lang="en-US" dirty="0"/>
           </a:p>
@@ -4314,7 +4314,7 @@
           <a:p>
             <a:fld id="{4509A250-FF31-4206-8172-F9D3106AACB1}" type="datetimeFigureOut">
               <a:rPr lang="en-US" smtClean="0"/>
-              <a:t>7/10/2018</a:t>
+              <a:t>7/29/2018</a:t>
             </a:fld>
             <a:endParaRPr lang="en-US" dirty="0"/>
           </a:p>
@@ -4577,7 +4577,7 @@
           <a:p>
             <a:fld id="{4509A250-FF31-4206-8172-F9D3106AACB1}" type="datetimeFigureOut">
               <a:rPr lang="en-US" smtClean="0"/>
-              <a:t>7/10/2018</a:t>
+              <a:t>7/29/2018</a:t>
             </a:fld>
             <a:endParaRPr lang="en-US" dirty="0"/>
           </a:p>
@@ -5320,7 +5320,7 @@
           <a:p>
             <a:fld id="{4AAD347D-5ACD-4C99-B74B-A9C85AD731AF}" type="datetimeFigureOut">
               <a:rPr lang="en-US" smtClean="0"/>
-              <a:t>7/10/2018</a:t>
+              <a:t>7/29/2018</a:t>
             </a:fld>
             <a:endParaRPr lang="en-US" dirty="0"/>
           </a:p>
@@ -7533,9 +7533,8 @@
             </a:r>
             <a:r>
               <a:rPr lang="en-US" b="1" dirty="0"/>
-              <a:t>4,599,389</a:t>
-            </a:r>
-            <a:endParaRPr lang="en-US" dirty="0"/>
+              <a:t>4,796,258</a:t>
+            </a:r>
           </a:p>
           <a:p>
             <a:pPr lvl="1"/>
@@ -7545,7 +7544,7 @@
             </a:r>
             <a:r>
               <a:rPr lang="en-US" b="1" dirty="0"/>
-              <a:t>4,544,377</a:t>
+              <a:t>4,562,856</a:t>
             </a:r>
             <a:endParaRPr lang="en-US" dirty="0"/>
           </a:p>
@@ -7644,85 +7643,731 @@
             <a:pPr lvl="1"/>
             <a:r>
               <a:rPr lang="en-US" dirty="0"/>
-              <a:t>Each incremental Point per game increases a player’s predicted salary by $670,000</a:t>
+              <a:t>Each incremental Point per game increases a player’s predicted salary by $718,000</a:t>
             </a:r>
           </a:p>
           <a:p>
             <a:pPr lvl="1"/>
             <a:r>
               <a:rPr lang="en-US" dirty="0"/>
-              <a:t>Each incremental Block per game increases a player’s predicted salary by $1.98M</a:t>
+              <a:t>Each incremental Block per game increases a player’s predicted salary by $1.51M</a:t>
             </a:r>
           </a:p>
           <a:p>
             <a:pPr lvl="1"/>
             <a:r>
               <a:rPr lang="en-US" dirty="0"/>
-              <a:t>Overall model explains nearly 64% of the variance of the players’ first non-rookie contract salary</a:t>
-            </a:r>
-          </a:p>
-        </p:txBody>
-      </p:sp>
-      <p:pic>
-        <p:nvPicPr>
-          <p:cNvPr id="4" name="Picture 3">
+              <a:t>Overall model explains nearly 67% of the variance of the players’ first non-rookie contract salary</a:t>
+            </a:r>
+          </a:p>
+        </p:txBody>
+      </p:sp>
+      <p:graphicFrame>
+        <p:nvGraphicFramePr>
+          <p:cNvPr id="6" name="Table 5">
             <a:extLst>
               <a:ext uri="{FF2B5EF4-FFF2-40B4-BE49-F238E27FC236}">
-                <a16:creationId xmlns:a16="http://schemas.microsoft.com/office/drawing/2014/main" id="{8D3CCC4E-FDE4-4836-BA91-8642E6BB247D}"/>
+                <a16:creationId xmlns:a16="http://schemas.microsoft.com/office/drawing/2014/main" id="{5BD01C5E-1B1C-4513-B2E7-651ABF0EA72E}"/>
               </a:ext>
             </a:extLst>
           </p:cNvPr>
-          <p:cNvPicPr>
-            <a:picLocks noChangeAspect="1"/>
-          </p:cNvPicPr>
+          <p:cNvGraphicFramePr>
+            <a:graphicFrameLocks noGrp="1"/>
+          </p:cNvGraphicFramePr>
+          <p:nvPr>
+            <p:extLst>
+              <p:ext uri="{D42A27DB-BD31-4B8C-83A1-F6EECF244321}">
+                <p14:modId xmlns:p14="http://schemas.microsoft.com/office/powerpoint/2010/main" val="2427603222"/>
+              </p:ext>
+            </p:extLst>
+          </p:nvPr>
+        </p:nvGraphicFramePr>
+        <p:xfrm>
+          <a:off x="6425368" y="2669636"/>
+          <a:ext cx="2166406" cy="1874082"/>
+        </p:xfrm>
+        <a:graphic>
+          <a:graphicData uri="http://schemas.openxmlformats.org/drawingml/2006/table">
+            <a:tbl>
+              <a:tblPr firstRow="1" firstCol="1" bandRow="1">
+                <a:tableStyleId>{5C22544A-7EE6-4342-B048-85BDC9FD1C3A}</a:tableStyleId>
+              </a:tblPr>
+              <a:tblGrid>
+                <a:gridCol w="1082780">
+                  <a:extLst>
+                    <a:ext uri="{9D8B030D-6E8A-4147-A177-3AD203B41FA5}">
+                      <a16:colId xmlns:a16="http://schemas.microsoft.com/office/drawing/2014/main" val="1491442858"/>
+                    </a:ext>
+                  </a:extLst>
+                </a:gridCol>
+                <a:gridCol w="1083626">
+                  <a:extLst>
+                    <a:ext uri="{9D8B030D-6E8A-4147-A177-3AD203B41FA5}">
+                      <a16:colId xmlns:a16="http://schemas.microsoft.com/office/drawing/2014/main" val="38125483"/>
+                    </a:ext>
+                  </a:extLst>
+                </a:gridCol>
+              </a:tblGrid>
+              <a:tr h="267726">
+                <a:tc>
+                  <a:txBody>
+                    <a:bodyPr/>
+                    <a:lstStyle/>
+                    <a:p>
+                      <a:pPr marL="0" marR="0">
+                        <a:lnSpc>
+                          <a:spcPct val="107000"/>
+                        </a:lnSpc>
+                        <a:spcBef>
+                          <a:spcPts val="0"/>
+                        </a:spcBef>
+                        <a:spcAft>
+                          <a:spcPts val="0"/>
+                        </a:spcAft>
+                      </a:pPr>
+                      <a:r>
+                        <a:rPr lang="en-US" sz="1400" dirty="0">
+                          <a:effectLst/>
+                        </a:rPr>
+                        <a:t>Variable</a:t>
+                      </a:r>
+                      <a:endParaRPr lang="en-US" sz="1600" dirty="0">
+                        <a:effectLst/>
+                        <a:latin typeface="Times New Roman" panose="02020603050405020304" pitchFamily="18" charset="0"/>
+                        <a:ea typeface="Times New Roman" panose="02020603050405020304" pitchFamily="18" charset="0"/>
+                        <a:cs typeface="Times New Roman" panose="02020603050405020304" pitchFamily="18" charset="0"/>
+                      </a:endParaRPr>
+                    </a:p>
+                  </a:txBody>
+                  <a:tcPr marL="68580" marR="68580" marT="0" marB="0" anchor="ctr"/>
+                </a:tc>
+                <a:tc>
+                  <a:txBody>
+                    <a:bodyPr/>
+                    <a:lstStyle/>
+                    <a:p>
+                      <a:pPr marL="0" marR="0">
+                        <a:lnSpc>
+                          <a:spcPct val="107000"/>
+                        </a:lnSpc>
+                        <a:spcBef>
+                          <a:spcPts val="0"/>
+                        </a:spcBef>
+                        <a:spcAft>
+                          <a:spcPts val="0"/>
+                        </a:spcAft>
+                      </a:pPr>
+                      <a:r>
+                        <a:rPr lang="en-US" sz="1400" dirty="0">
+                          <a:effectLst/>
+                        </a:rPr>
+                        <a:t>Coefficient</a:t>
+                      </a:r>
+                      <a:endParaRPr lang="en-US" sz="1600" dirty="0">
+                        <a:effectLst/>
+                        <a:latin typeface="Times New Roman" panose="02020603050405020304" pitchFamily="18" charset="0"/>
+                        <a:ea typeface="Times New Roman" panose="02020603050405020304" pitchFamily="18" charset="0"/>
+                        <a:cs typeface="Times New Roman" panose="02020603050405020304" pitchFamily="18" charset="0"/>
+                      </a:endParaRPr>
+                    </a:p>
+                  </a:txBody>
+                  <a:tcPr marL="68580" marR="68580" marT="0" marB="0"/>
+                </a:tc>
+                <a:extLst>
+                  <a:ext uri="{0D108BD9-81ED-4DB2-BD59-A6C34878D82A}">
+                    <a16:rowId xmlns:a16="http://schemas.microsoft.com/office/drawing/2014/main" val="3521233120"/>
+                  </a:ext>
+                </a:extLst>
+              </a:tr>
+              <a:tr h="267726">
+                <a:tc>
+                  <a:txBody>
+                    <a:bodyPr/>
+                    <a:lstStyle/>
+                    <a:p>
+                      <a:pPr marL="0" marR="0">
+                        <a:lnSpc>
+                          <a:spcPct val="107000"/>
+                        </a:lnSpc>
+                        <a:spcBef>
+                          <a:spcPts val="0"/>
+                        </a:spcBef>
+                        <a:spcAft>
+                          <a:spcPts val="0"/>
+                        </a:spcAft>
+                      </a:pPr>
+                      <a:r>
+                        <a:rPr lang="en-US" sz="1400" dirty="0">
+                          <a:effectLst/>
+                        </a:rPr>
+                        <a:t>PTS</a:t>
+                      </a:r>
+                      <a:endParaRPr lang="en-US" sz="1600" dirty="0">
+                        <a:effectLst/>
+                        <a:latin typeface="Times New Roman" panose="02020603050405020304" pitchFamily="18" charset="0"/>
+                        <a:ea typeface="Times New Roman" panose="02020603050405020304" pitchFamily="18" charset="0"/>
+                        <a:cs typeface="Times New Roman" panose="02020603050405020304" pitchFamily="18" charset="0"/>
+                      </a:endParaRPr>
+                    </a:p>
+                  </a:txBody>
+                  <a:tcPr marL="68580" marR="68580" marT="0" marB="0" anchor="ctr"/>
+                </a:tc>
+                <a:tc>
+                  <a:txBody>
+                    <a:bodyPr/>
+                    <a:lstStyle/>
+                    <a:p>
+                      <a:pPr marL="0" marR="0" algn="r">
+                        <a:lnSpc>
+                          <a:spcPct val="107000"/>
+                        </a:lnSpc>
+                        <a:spcBef>
+                          <a:spcPts val="0"/>
+                        </a:spcBef>
+                        <a:spcAft>
+                          <a:spcPts val="0"/>
+                        </a:spcAft>
+                      </a:pPr>
+                      <a:r>
+                        <a:rPr lang="en-US" sz="1400" dirty="0">
+                          <a:effectLst/>
+                        </a:rPr>
+                        <a:t>718,183</a:t>
+                      </a:r>
+                      <a:endParaRPr lang="en-US" sz="1600" dirty="0">
+                        <a:effectLst/>
+                        <a:latin typeface="Times New Roman" panose="02020603050405020304" pitchFamily="18" charset="0"/>
+                        <a:ea typeface="Times New Roman" panose="02020603050405020304" pitchFamily="18" charset="0"/>
+                        <a:cs typeface="Times New Roman" panose="02020603050405020304" pitchFamily="18" charset="0"/>
+                      </a:endParaRPr>
+                    </a:p>
+                  </a:txBody>
+                  <a:tcPr marL="68580" marR="68580" marT="0" marB="0" anchor="ctr"/>
+                </a:tc>
+                <a:extLst>
+                  <a:ext uri="{0D108BD9-81ED-4DB2-BD59-A6C34878D82A}">
+                    <a16:rowId xmlns:a16="http://schemas.microsoft.com/office/drawing/2014/main" val="749613456"/>
+                  </a:ext>
+                </a:extLst>
+              </a:tr>
+              <a:tr h="267726">
+                <a:tc>
+                  <a:txBody>
+                    <a:bodyPr/>
+                    <a:lstStyle/>
+                    <a:p>
+                      <a:pPr marL="0" marR="0">
+                        <a:lnSpc>
+                          <a:spcPct val="107000"/>
+                        </a:lnSpc>
+                        <a:spcBef>
+                          <a:spcPts val="0"/>
+                        </a:spcBef>
+                        <a:spcAft>
+                          <a:spcPts val="0"/>
+                        </a:spcAft>
+                      </a:pPr>
+                      <a:r>
+                        <a:rPr lang="en-US" sz="1400" dirty="0">
+                          <a:effectLst/>
+                        </a:rPr>
+                        <a:t>AST</a:t>
+                      </a:r>
+                      <a:endParaRPr lang="en-US" sz="1600" dirty="0">
+                        <a:effectLst/>
+                        <a:latin typeface="Times New Roman" panose="02020603050405020304" pitchFamily="18" charset="0"/>
+                        <a:ea typeface="Times New Roman" panose="02020603050405020304" pitchFamily="18" charset="0"/>
+                        <a:cs typeface="Times New Roman" panose="02020603050405020304" pitchFamily="18" charset="0"/>
+                      </a:endParaRPr>
+                    </a:p>
+                  </a:txBody>
+                  <a:tcPr marL="68580" marR="68580" marT="0" marB="0" anchor="ctr"/>
+                </a:tc>
+                <a:tc>
+                  <a:txBody>
+                    <a:bodyPr/>
+                    <a:lstStyle/>
+                    <a:p>
+                      <a:pPr marL="0" marR="0" algn="r">
+                        <a:lnSpc>
+                          <a:spcPct val="107000"/>
+                        </a:lnSpc>
+                        <a:spcBef>
+                          <a:spcPts val="0"/>
+                        </a:spcBef>
+                        <a:spcAft>
+                          <a:spcPts val="0"/>
+                        </a:spcAft>
+                      </a:pPr>
+                      <a:r>
+                        <a:rPr lang="en-US" sz="1400" dirty="0">
+                          <a:effectLst/>
+                        </a:rPr>
+                        <a:t>323,0491</a:t>
+                      </a:r>
+                      <a:endParaRPr lang="en-US" sz="1600" dirty="0">
+                        <a:effectLst/>
+                        <a:latin typeface="Times New Roman" panose="02020603050405020304" pitchFamily="18" charset="0"/>
+                        <a:ea typeface="Times New Roman" panose="02020603050405020304" pitchFamily="18" charset="0"/>
+                        <a:cs typeface="Times New Roman" panose="02020603050405020304" pitchFamily="18" charset="0"/>
+                      </a:endParaRPr>
+                    </a:p>
+                  </a:txBody>
+                  <a:tcPr marL="68580" marR="68580" marT="0" marB="0" anchor="ctr"/>
+                </a:tc>
+                <a:extLst>
+                  <a:ext uri="{0D108BD9-81ED-4DB2-BD59-A6C34878D82A}">
+                    <a16:rowId xmlns:a16="http://schemas.microsoft.com/office/drawing/2014/main" val="4267777699"/>
+                  </a:ext>
+                </a:extLst>
+              </a:tr>
+              <a:tr h="267726">
+                <a:tc>
+                  <a:txBody>
+                    <a:bodyPr/>
+                    <a:lstStyle/>
+                    <a:p>
+                      <a:pPr marL="0" marR="0">
+                        <a:lnSpc>
+                          <a:spcPct val="107000"/>
+                        </a:lnSpc>
+                        <a:spcBef>
+                          <a:spcPts val="0"/>
+                        </a:spcBef>
+                        <a:spcAft>
+                          <a:spcPts val="0"/>
+                        </a:spcAft>
+                      </a:pPr>
+                      <a:r>
+                        <a:rPr lang="en-US" sz="1400">
+                          <a:effectLst/>
+                        </a:rPr>
+                        <a:t>TRB</a:t>
+                      </a:r>
+                      <a:endParaRPr lang="en-US" sz="1600">
+                        <a:effectLst/>
+                        <a:latin typeface="Times New Roman" panose="02020603050405020304" pitchFamily="18" charset="0"/>
+                        <a:ea typeface="Times New Roman" panose="02020603050405020304" pitchFamily="18" charset="0"/>
+                        <a:cs typeface="Times New Roman" panose="02020603050405020304" pitchFamily="18" charset="0"/>
+                      </a:endParaRPr>
+                    </a:p>
+                  </a:txBody>
+                  <a:tcPr marL="68580" marR="68580" marT="0" marB="0" anchor="ctr"/>
+                </a:tc>
+                <a:tc>
+                  <a:txBody>
+                    <a:bodyPr/>
+                    <a:lstStyle/>
+                    <a:p>
+                      <a:pPr marL="0" marR="0" algn="r">
+                        <a:lnSpc>
+                          <a:spcPct val="107000"/>
+                        </a:lnSpc>
+                        <a:spcBef>
+                          <a:spcPts val="0"/>
+                        </a:spcBef>
+                        <a:spcAft>
+                          <a:spcPts val="0"/>
+                        </a:spcAft>
+                      </a:pPr>
+                      <a:r>
+                        <a:rPr lang="en-US" sz="1400" dirty="0">
+                          <a:effectLst/>
+                        </a:rPr>
+                        <a:t>345,619</a:t>
+                      </a:r>
+                      <a:endParaRPr lang="en-US" sz="1600" dirty="0">
+                        <a:effectLst/>
+                        <a:latin typeface="Times New Roman" panose="02020603050405020304" pitchFamily="18" charset="0"/>
+                        <a:ea typeface="Times New Roman" panose="02020603050405020304" pitchFamily="18" charset="0"/>
+                        <a:cs typeface="Times New Roman" panose="02020603050405020304" pitchFamily="18" charset="0"/>
+                      </a:endParaRPr>
+                    </a:p>
+                  </a:txBody>
+                  <a:tcPr marL="68580" marR="68580" marT="0" marB="0" anchor="ctr"/>
+                </a:tc>
+                <a:extLst>
+                  <a:ext uri="{0D108BD9-81ED-4DB2-BD59-A6C34878D82A}">
+                    <a16:rowId xmlns:a16="http://schemas.microsoft.com/office/drawing/2014/main" val="2653712427"/>
+                  </a:ext>
+                </a:extLst>
+              </a:tr>
+              <a:tr h="267726">
+                <a:tc>
+                  <a:txBody>
+                    <a:bodyPr/>
+                    <a:lstStyle/>
+                    <a:p>
+                      <a:pPr marL="0" marR="0">
+                        <a:lnSpc>
+                          <a:spcPct val="107000"/>
+                        </a:lnSpc>
+                        <a:spcBef>
+                          <a:spcPts val="0"/>
+                        </a:spcBef>
+                        <a:spcAft>
+                          <a:spcPts val="0"/>
+                        </a:spcAft>
+                      </a:pPr>
+                      <a:r>
+                        <a:rPr lang="en-US" sz="1400">
+                          <a:effectLst/>
+                        </a:rPr>
+                        <a:t>BLK</a:t>
+                      </a:r>
+                      <a:endParaRPr lang="en-US" sz="1600">
+                        <a:effectLst/>
+                        <a:latin typeface="Times New Roman" panose="02020603050405020304" pitchFamily="18" charset="0"/>
+                        <a:ea typeface="Times New Roman" panose="02020603050405020304" pitchFamily="18" charset="0"/>
+                        <a:cs typeface="Times New Roman" panose="02020603050405020304" pitchFamily="18" charset="0"/>
+                      </a:endParaRPr>
+                    </a:p>
+                  </a:txBody>
+                  <a:tcPr marL="68580" marR="68580" marT="0" marB="0" anchor="ctr"/>
+                </a:tc>
+                <a:tc>
+                  <a:txBody>
+                    <a:bodyPr/>
+                    <a:lstStyle/>
+                    <a:p>
+                      <a:pPr marL="0" marR="0" algn="r">
+                        <a:lnSpc>
+                          <a:spcPct val="107000"/>
+                        </a:lnSpc>
+                        <a:spcBef>
+                          <a:spcPts val="0"/>
+                        </a:spcBef>
+                        <a:spcAft>
+                          <a:spcPts val="0"/>
+                        </a:spcAft>
+                      </a:pPr>
+                      <a:r>
+                        <a:rPr lang="en-US" sz="1400" dirty="0">
+                          <a:effectLst/>
+                        </a:rPr>
+                        <a:t>1,512,113</a:t>
+                      </a:r>
+                      <a:endParaRPr lang="en-US" sz="1600" dirty="0">
+                        <a:effectLst/>
+                        <a:latin typeface="Times New Roman" panose="02020603050405020304" pitchFamily="18" charset="0"/>
+                        <a:ea typeface="Times New Roman" panose="02020603050405020304" pitchFamily="18" charset="0"/>
+                        <a:cs typeface="Times New Roman" panose="02020603050405020304" pitchFamily="18" charset="0"/>
+                      </a:endParaRPr>
+                    </a:p>
+                  </a:txBody>
+                  <a:tcPr marL="68580" marR="68580" marT="0" marB="0" anchor="ctr"/>
+                </a:tc>
+                <a:extLst>
+                  <a:ext uri="{0D108BD9-81ED-4DB2-BD59-A6C34878D82A}">
+                    <a16:rowId xmlns:a16="http://schemas.microsoft.com/office/drawing/2014/main" val="1501158645"/>
+                  </a:ext>
+                </a:extLst>
+              </a:tr>
+              <a:tr h="267726">
+                <a:tc>
+                  <a:txBody>
+                    <a:bodyPr/>
+                    <a:lstStyle/>
+                    <a:p>
+                      <a:pPr marL="0" marR="0">
+                        <a:lnSpc>
+                          <a:spcPct val="107000"/>
+                        </a:lnSpc>
+                        <a:spcBef>
+                          <a:spcPts val="0"/>
+                        </a:spcBef>
+                        <a:spcAft>
+                          <a:spcPts val="0"/>
+                        </a:spcAft>
+                      </a:pPr>
+                      <a:r>
+                        <a:rPr lang="en-US" sz="1400">
+                          <a:effectLst/>
+                        </a:rPr>
+                        <a:t>DWS</a:t>
+                      </a:r>
+                      <a:endParaRPr lang="en-US" sz="1600">
+                        <a:effectLst/>
+                        <a:latin typeface="Times New Roman" panose="02020603050405020304" pitchFamily="18" charset="0"/>
+                        <a:ea typeface="Times New Roman" panose="02020603050405020304" pitchFamily="18" charset="0"/>
+                        <a:cs typeface="Times New Roman" panose="02020603050405020304" pitchFamily="18" charset="0"/>
+                      </a:endParaRPr>
+                    </a:p>
+                  </a:txBody>
+                  <a:tcPr marL="68580" marR="68580" marT="0" marB="0" anchor="ctr"/>
+                </a:tc>
+                <a:tc>
+                  <a:txBody>
+                    <a:bodyPr/>
+                    <a:lstStyle/>
+                    <a:p>
+                      <a:pPr marL="0" marR="0" algn="r">
+                        <a:lnSpc>
+                          <a:spcPct val="107000"/>
+                        </a:lnSpc>
+                        <a:spcBef>
+                          <a:spcPts val="0"/>
+                        </a:spcBef>
+                        <a:spcAft>
+                          <a:spcPts val="0"/>
+                        </a:spcAft>
+                      </a:pPr>
+                      <a:r>
+                        <a:rPr lang="en-US" sz="1400" dirty="0">
+                          <a:effectLst/>
+                        </a:rPr>
+                        <a:t>1,831,869</a:t>
+                      </a:r>
+                      <a:endParaRPr lang="en-US" sz="1600" dirty="0">
+                        <a:effectLst/>
+                        <a:latin typeface="Times New Roman" panose="02020603050405020304" pitchFamily="18" charset="0"/>
+                        <a:ea typeface="Times New Roman" panose="02020603050405020304" pitchFamily="18" charset="0"/>
+                        <a:cs typeface="Times New Roman" panose="02020603050405020304" pitchFamily="18" charset="0"/>
+                      </a:endParaRPr>
+                    </a:p>
+                  </a:txBody>
+                  <a:tcPr marL="68580" marR="68580" marT="0" marB="0" anchor="ctr"/>
+                </a:tc>
+                <a:extLst>
+                  <a:ext uri="{0D108BD9-81ED-4DB2-BD59-A6C34878D82A}">
+                    <a16:rowId xmlns:a16="http://schemas.microsoft.com/office/drawing/2014/main" val="180282874"/>
+                  </a:ext>
+                </a:extLst>
+              </a:tr>
+              <a:tr h="267726">
+                <a:tc>
+                  <a:txBody>
+                    <a:bodyPr/>
+                    <a:lstStyle/>
+                    <a:p>
+                      <a:pPr marL="0" marR="0">
+                        <a:lnSpc>
+                          <a:spcPct val="107000"/>
+                        </a:lnSpc>
+                        <a:spcBef>
+                          <a:spcPts val="0"/>
+                        </a:spcBef>
+                        <a:spcAft>
+                          <a:spcPts val="0"/>
+                        </a:spcAft>
+                      </a:pPr>
+                      <a:r>
+                        <a:rPr lang="en-US" sz="1400" dirty="0">
+                          <a:effectLst/>
+                        </a:rPr>
+                        <a:t>Age</a:t>
+                      </a:r>
+                      <a:endParaRPr lang="en-US" sz="1600" dirty="0">
+                        <a:effectLst/>
+                        <a:latin typeface="Times New Roman" panose="02020603050405020304" pitchFamily="18" charset="0"/>
+                        <a:ea typeface="Times New Roman" panose="02020603050405020304" pitchFamily="18" charset="0"/>
+                        <a:cs typeface="Times New Roman" panose="02020603050405020304" pitchFamily="18" charset="0"/>
+                      </a:endParaRPr>
+                    </a:p>
+                  </a:txBody>
+                  <a:tcPr marL="68580" marR="68580" marT="0" marB="0" anchor="ctr"/>
+                </a:tc>
+                <a:tc>
+                  <a:txBody>
+                    <a:bodyPr/>
+                    <a:lstStyle/>
+                    <a:p>
+                      <a:pPr marL="0" marR="0" algn="r">
+                        <a:lnSpc>
+                          <a:spcPct val="107000"/>
+                        </a:lnSpc>
+                        <a:spcBef>
+                          <a:spcPts val="0"/>
+                        </a:spcBef>
+                        <a:spcAft>
+                          <a:spcPts val="0"/>
+                        </a:spcAft>
+                      </a:pPr>
+                      <a:r>
+                        <a:rPr lang="en-US" sz="1400" dirty="0">
+                          <a:effectLst/>
+                        </a:rPr>
+                        <a:t>-389,763</a:t>
+                      </a:r>
+                      <a:endParaRPr lang="en-US" sz="1600" dirty="0">
+                        <a:effectLst/>
+                        <a:latin typeface="Times New Roman" panose="02020603050405020304" pitchFamily="18" charset="0"/>
+                        <a:ea typeface="Times New Roman" panose="02020603050405020304" pitchFamily="18" charset="0"/>
+                        <a:cs typeface="Times New Roman" panose="02020603050405020304" pitchFamily="18" charset="0"/>
+                      </a:endParaRPr>
+                    </a:p>
+                  </a:txBody>
+                  <a:tcPr marL="68580" marR="68580" marT="0" marB="0" anchor="ctr"/>
+                </a:tc>
+                <a:extLst>
+                  <a:ext uri="{0D108BD9-81ED-4DB2-BD59-A6C34878D82A}">
+                    <a16:rowId xmlns:a16="http://schemas.microsoft.com/office/drawing/2014/main" val="3832565429"/>
+                  </a:ext>
+                </a:extLst>
+              </a:tr>
+            </a:tbl>
+          </a:graphicData>
+        </a:graphic>
+      </p:graphicFrame>
+      <p:sp>
+        <p:nvSpPr>
+          <p:cNvPr id="7" name="Rectangle 1">
+            <a:extLst>
+              <a:ext uri="{FF2B5EF4-FFF2-40B4-BE49-F238E27FC236}">
+                <a16:creationId xmlns:a16="http://schemas.microsoft.com/office/drawing/2014/main" id="{30C4CF2D-7D4D-4264-BB57-9966C1FF8DE7}"/>
+              </a:ext>
+            </a:extLst>
+          </p:cNvPr>
+          <p:cNvSpPr>
+            <a:spLocks noChangeArrowheads="1"/>
+          </p:cNvSpPr>
           <p:nvPr/>
-        </p:nvPicPr>
-        <p:blipFill>
-          <a:blip r:embed="rId2"/>
-          <a:stretch>
-            <a:fillRect/>
-          </a:stretch>
-        </p:blipFill>
-        <p:spPr>
+        </p:nvSpPr>
+        <p:spPr bwMode="auto">
           <a:xfrm>
-            <a:off x="5763069" y="1616289"/>
-            <a:ext cx="5944872" cy="2739302"/>
+            <a:off x="6322243" y="4648044"/>
+            <a:ext cx="4342640" cy="369332"/>
           </a:xfrm>
           <a:prstGeom prst="rect">
             <a:avLst/>
           </a:prstGeom>
+          <a:noFill/>
+          <a:ln>
+            <a:noFill/>
+          </a:ln>
+          <a:effectLst/>
+          <a:extLst>
+            <a:ext uri="{909E8E84-426E-40DD-AFC4-6F175D3DCCD1}">
+              <a14:hiddenFill xmlns:a14="http://schemas.microsoft.com/office/drawing/2010/main">
+                <a:solidFill>
+                  <a:schemeClr val="accent1"/>
+                </a:solidFill>
+              </a14:hiddenFill>
+            </a:ext>
+            <a:ext uri="{91240B29-F687-4F45-9708-019B960494DF}">
+              <a14:hiddenLine xmlns:a14="http://schemas.microsoft.com/office/drawing/2010/main" w="9525">
+                <a:solidFill>
+                  <a:schemeClr val="tx1"/>
+                </a:solidFill>
+                <a:miter lim="800000"/>
+                <a:headEnd/>
+                <a:tailEnd/>
+              </a14:hiddenLine>
+            </a:ext>
+            <a:ext uri="{AF507438-7753-43E0-B8FC-AC1667EBCBE1}">
+              <a14:hiddenEffects xmlns:a14="http://schemas.microsoft.com/office/drawing/2010/main">
+                <a:effectLst>
+                  <a:outerShdw dist="35921" dir="2700000" algn="ctr" rotWithShape="0">
+                    <a:schemeClr val="bg2"/>
+                  </a:outerShdw>
+                </a:effectLst>
+              </a14:hiddenEffects>
+            </a:ext>
+          </a:extLst>
         </p:spPr>
-      </p:pic>
-      <p:pic>
-        <p:nvPicPr>
-          <p:cNvPr id="5" name="Picture 4">
+        <p:txBody>
+          <a:bodyPr vert="horz" wrap="square" lIns="91440" tIns="45720" rIns="91440" bIns="45720" numCol="1" anchor="ctr" anchorCtr="0" compatLnSpc="1">
+            <a:prstTxWarp prst="textNoShape">
+              <a:avLst/>
+            </a:prstTxWarp>
+            <a:spAutoFit/>
+          </a:bodyPr>
+          <a:lstStyle/>
+          <a:p>
+            <a:pPr marL="0" marR="0" lvl="0" indent="0" algn="l" defTabSz="914400" rtl="0" eaLnBrk="0" fontAlgn="base" latinLnBrk="0" hangingPunct="0">
+              <a:lnSpc>
+                <a:spcPct val="100000"/>
+              </a:lnSpc>
+              <a:spcBef>
+                <a:spcPct val="0"/>
+              </a:spcBef>
+              <a:spcAft>
+                <a:spcPct val="0"/>
+              </a:spcAft>
+              <a:buClrTx/>
+              <a:buSzTx/>
+              <a:buFontTx/>
+              <a:buNone/>
+              <a:tabLst/>
+            </a:pPr>
+            <a:r>
+              <a:rPr kumimoji="0" lang="en-US" altLang="en-US" b="0" i="0" u="none" strike="noStrike" cap="none" normalizeH="0" baseline="0" dirty="0">
+                <a:ln>
+                  <a:noFill/>
+                </a:ln>
+                <a:solidFill>
+                  <a:schemeClr val="tx1"/>
+                </a:solidFill>
+                <a:effectLst/>
+                <a:latin typeface="Arial" panose="020B0604020202020204" pitchFamily="34" charset="0"/>
+                <a:ea typeface="Calibri" panose="020F0502020204030204" pitchFamily="34" charset="0"/>
+                <a:cs typeface="Times New Roman" panose="02020603050405020304" pitchFamily="18" charset="0"/>
+              </a:rPr>
+              <a:t>Root Mean Squared Error: </a:t>
+            </a:r>
+            <a:r>
+              <a:rPr kumimoji="0" lang="en-US" altLang="en-US" b="1" i="0" u="none" strike="noStrike" cap="none" normalizeH="0" baseline="0" dirty="0">
+                <a:ln>
+                  <a:noFill/>
+                </a:ln>
+                <a:solidFill>
+                  <a:srgbClr val="000000"/>
+                </a:solidFill>
+                <a:effectLst/>
+                <a:latin typeface="Courier New" panose="02070309020205020404" pitchFamily="49" charset="0"/>
+                <a:ea typeface="Times New Roman" panose="02020603050405020304" pitchFamily="18" charset="0"/>
+                <a:cs typeface="Courier New" panose="02070309020205020404" pitchFamily="49" charset="0"/>
+              </a:rPr>
+              <a:t>4,796,257</a:t>
+            </a:r>
+            <a:endParaRPr kumimoji="0" lang="en-US" altLang="en-US" b="0" i="0" u="none" strike="noStrike" cap="none" normalizeH="0" baseline="0" dirty="0">
+              <a:ln>
+                <a:noFill/>
+              </a:ln>
+              <a:solidFill>
+                <a:schemeClr val="tx1"/>
+              </a:solidFill>
+              <a:effectLst/>
+              <a:latin typeface="Arial" panose="020B0604020202020204" pitchFamily="34" charset="0"/>
+            </a:endParaRPr>
+          </a:p>
+        </p:txBody>
+      </p:sp>
+      <p:sp>
+        <p:nvSpPr>
+          <p:cNvPr id="8" name="TextBox 7">
             <a:extLst>
               <a:ext uri="{FF2B5EF4-FFF2-40B4-BE49-F238E27FC236}">
-                <a16:creationId xmlns:a16="http://schemas.microsoft.com/office/drawing/2014/main" id="{82751FB1-3D79-49BC-BD48-CF7693E63DE0}"/>
+                <a16:creationId xmlns:a16="http://schemas.microsoft.com/office/drawing/2014/main" id="{A9BB48C9-7B57-4724-9199-8E777A1FA521}"/>
               </a:ext>
             </a:extLst>
           </p:cNvPr>
-          <p:cNvPicPr>
-            <a:picLocks noChangeAspect="1"/>
-          </p:cNvPicPr>
+          <p:cNvSpPr txBox="1"/>
           <p:nvPr/>
-        </p:nvPicPr>
-        <p:blipFill>
-          <a:blip r:embed="rId3"/>
-          <a:stretch>
-            <a:fillRect/>
-          </a:stretch>
-        </p:blipFill>
+        </p:nvSpPr>
         <p:spPr>
           <a:xfrm>
-            <a:off x="5763069" y="4244151"/>
-            <a:ext cx="5944872" cy="2236258"/>
+            <a:off x="6425368" y="2248141"/>
+            <a:ext cx="2068195" cy="369332"/>
           </a:xfrm>
           <a:prstGeom prst="rect">
             <a:avLst/>
           </a:prstGeom>
+          <a:noFill/>
         </p:spPr>
-      </p:pic>
+        <p:txBody>
+          <a:bodyPr wrap="none" rtlCol="0">
+            <a:spAutoFit/>
+          </a:bodyPr>
+          <a:lstStyle/>
+          <a:p>
+            <a:r>
+              <a:rPr lang="en-US" dirty="0"/>
+              <a:t>R Squared: 0.6725</a:t>
+            </a:r>
+          </a:p>
+        </p:txBody>
+      </p:sp>
     </p:spTree>
     <p:extLst>
       <p:ext uri="{BB962C8B-B14F-4D97-AF65-F5344CB8AC3E}">

</xml_diff>